<commit_message>
Made Schema Image Transparent in ppt
</commit_message>
<xml_diff>
--- a/docs/HAD project.pptx
+++ b/docs/HAD project.pptx
@@ -114,7 +114,7 @@
   </p:defaultTextStyle>
   <p:extLst>
     <p:ext uri="{EFAFB233-063F-42B5-8137-9DF3F51BA10A}">
-      <p15:sldGuideLst xmlns:p15="http://schemas.microsoft.com/office/powerpoint/2012/main"/>
+      <p15:sldGuideLst xmlns:p15="http://schemas.microsoft.com/office/powerpoint/2012/main" xmlns=""/>
     </p:ext>
   </p:extLst>
 </p:presentation>
@@ -865,6 +865,7 @@
           <a:p>
             <a:fld id="{5E0691F5-9D0C-4B99-AAF3-BF4DD8AE5AD6}" type="datetimeFigureOut">
               <a:rPr lang="en-IN" smtClean="0"/>
+              <a:pPr/>
               <a:t>09-02-2016</a:t>
             </a:fld>
             <a:endParaRPr lang="en-IN"/>
@@ -907,6 +908,7 @@
           <a:p>
             <a:fld id="{F6D66933-757C-4414-A1AA-1CEBFB93AF97}" type="slidenum">
               <a:rPr lang="en-IN" smtClean="0"/>
+              <a:pPr/>
               <a:t>‹#›</a:t>
             </a:fld>
             <a:endParaRPr lang="en-IN"/>
@@ -916,7 +918,7 @@
     </p:spTree>
     <p:extLst>
       <p:ext uri="{BB962C8B-B14F-4D97-AF65-F5344CB8AC3E}">
-        <p14:creationId xmlns:p14="http://schemas.microsoft.com/office/powerpoint/2010/main" val="745236216"/>
+        <p14:creationId xmlns:p14="http://schemas.microsoft.com/office/powerpoint/2010/main" xmlns="" val="745236216"/>
       </p:ext>
     </p:extLst>
   </p:cSld>
@@ -1116,6 +1118,7 @@
           <a:p>
             <a:fld id="{5E0691F5-9D0C-4B99-AAF3-BF4DD8AE5AD6}" type="datetimeFigureOut">
               <a:rPr lang="en-IN" smtClean="0"/>
+              <a:pPr/>
               <a:t>09-02-2016</a:t>
             </a:fld>
             <a:endParaRPr lang="en-IN"/>
@@ -1158,6 +1161,7 @@
           <a:p>
             <a:fld id="{F6D66933-757C-4414-A1AA-1CEBFB93AF97}" type="slidenum">
               <a:rPr lang="en-IN" smtClean="0"/>
+              <a:pPr/>
               <a:t>‹#›</a:t>
             </a:fld>
             <a:endParaRPr lang="en-IN"/>
@@ -1167,7 +1171,7 @@
     </p:spTree>
     <p:extLst>
       <p:ext uri="{BB962C8B-B14F-4D97-AF65-F5344CB8AC3E}">
-        <p14:creationId xmlns:p14="http://schemas.microsoft.com/office/powerpoint/2010/main" val="2293863678"/>
+        <p14:creationId xmlns:p14="http://schemas.microsoft.com/office/powerpoint/2010/main" xmlns="" val="2293863678"/>
       </p:ext>
     </p:extLst>
   </p:cSld>
@@ -1430,6 +1434,7 @@
           <a:p>
             <a:fld id="{5E0691F5-9D0C-4B99-AAF3-BF4DD8AE5AD6}" type="datetimeFigureOut">
               <a:rPr lang="en-IN" smtClean="0"/>
+              <a:pPr/>
               <a:t>09-02-2016</a:t>
             </a:fld>
             <a:endParaRPr lang="en-IN"/>
@@ -1472,6 +1477,7 @@
           <a:p>
             <a:fld id="{F6D66933-757C-4414-A1AA-1CEBFB93AF97}" type="slidenum">
               <a:rPr lang="en-IN" smtClean="0"/>
+              <a:pPr/>
               <a:t>‹#›</a:t>
             </a:fld>
             <a:endParaRPr lang="en-IN"/>
@@ -1563,7 +1569,7 @@
     </p:spTree>
     <p:extLst>
       <p:ext uri="{BB962C8B-B14F-4D97-AF65-F5344CB8AC3E}">
-        <p14:creationId xmlns:p14="http://schemas.microsoft.com/office/powerpoint/2010/main" val="3646211488"/>
+        <p14:creationId xmlns:p14="http://schemas.microsoft.com/office/powerpoint/2010/main" xmlns="" val="3646211488"/>
       </p:ext>
     </p:extLst>
   </p:cSld>
@@ -1763,6 +1769,7 @@
           <a:p>
             <a:fld id="{5E0691F5-9D0C-4B99-AAF3-BF4DD8AE5AD6}" type="datetimeFigureOut">
               <a:rPr lang="en-IN" smtClean="0"/>
+              <a:pPr/>
               <a:t>09-02-2016</a:t>
             </a:fld>
             <a:endParaRPr lang="en-IN"/>
@@ -1805,6 +1812,7 @@
           <a:p>
             <a:fld id="{F6D66933-757C-4414-A1AA-1CEBFB93AF97}" type="slidenum">
               <a:rPr lang="en-IN" smtClean="0"/>
+              <a:pPr/>
               <a:t>‹#›</a:t>
             </a:fld>
             <a:endParaRPr lang="en-IN"/>
@@ -1814,7 +1822,7 @@
     </p:spTree>
     <p:extLst>
       <p:ext uri="{BB962C8B-B14F-4D97-AF65-F5344CB8AC3E}">
-        <p14:creationId xmlns:p14="http://schemas.microsoft.com/office/powerpoint/2010/main" val="130304460"/>
+        <p14:creationId xmlns:p14="http://schemas.microsoft.com/office/powerpoint/2010/main" xmlns="" val="130304460"/>
       </p:ext>
     </p:extLst>
   </p:cSld>
@@ -2077,6 +2085,7 @@
           <a:p>
             <a:fld id="{5E0691F5-9D0C-4B99-AAF3-BF4DD8AE5AD6}" type="datetimeFigureOut">
               <a:rPr lang="en-IN" smtClean="0"/>
+              <a:pPr/>
               <a:t>09-02-2016</a:t>
             </a:fld>
             <a:endParaRPr lang="en-IN"/>
@@ -2119,6 +2128,7 @@
           <a:p>
             <a:fld id="{F6D66933-757C-4414-A1AA-1CEBFB93AF97}" type="slidenum">
               <a:rPr lang="en-IN" smtClean="0"/>
+              <a:pPr/>
               <a:t>‹#›</a:t>
             </a:fld>
             <a:endParaRPr lang="en-IN"/>
@@ -2210,7 +2220,7 @@
     </p:spTree>
     <p:extLst>
       <p:ext uri="{BB962C8B-B14F-4D97-AF65-F5344CB8AC3E}">
-        <p14:creationId xmlns:p14="http://schemas.microsoft.com/office/powerpoint/2010/main" val="988258245"/>
+        <p14:creationId xmlns:p14="http://schemas.microsoft.com/office/powerpoint/2010/main" xmlns="" val="988258245"/>
       </p:ext>
     </p:extLst>
   </p:cSld>
@@ -2470,6 +2480,7 @@
           <a:p>
             <a:fld id="{5E0691F5-9D0C-4B99-AAF3-BF4DD8AE5AD6}" type="datetimeFigureOut">
               <a:rPr lang="en-IN" smtClean="0"/>
+              <a:pPr/>
               <a:t>09-02-2016</a:t>
             </a:fld>
             <a:endParaRPr lang="en-IN"/>
@@ -2512,6 +2523,7 @@
           <a:p>
             <a:fld id="{F6D66933-757C-4414-A1AA-1CEBFB93AF97}" type="slidenum">
               <a:rPr lang="en-IN" smtClean="0"/>
+              <a:pPr/>
               <a:t>‹#›</a:t>
             </a:fld>
             <a:endParaRPr lang="en-IN"/>
@@ -2521,7 +2533,7 @@
     </p:spTree>
     <p:extLst>
       <p:ext uri="{BB962C8B-B14F-4D97-AF65-F5344CB8AC3E}">
-        <p14:creationId xmlns:p14="http://schemas.microsoft.com/office/powerpoint/2010/main" val="1129624647"/>
+        <p14:creationId xmlns:p14="http://schemas.microsoft.com/office/powerpoint/2010/main" xmlns="" val="1129624647"/>
       </p:ext>
     </p:extLst>
   </p:cSld>
@@ -2640,6 +2652,7 @@
           <a:p>
             <a:fld id="{5E0691F5-9D0C-4B99-AAF3-BF4DD8AE5AD6}" type="datetimeFigureOut">
               <a:rPr lang="en-IN" smtClean="0"/>
+              <a:pPr/>
               <a:t>09-02-2016</a:t>
             </a:fld>
             <a:endParaRPr lang="en-IN"/>
@@ -2682,6 +2695,7 @@
           <a:p>
             <a:fld id="{F6D66933-757C-4414-A1AA-1CEBFB93AF97}" type="slidenum">
               <a:rPr lang="en-IN" smtClean="0"/>
+              <a:pPr/>
               <a:t>‹#›</a:t>
             </a:fld>
             <a:endParaRPr lang="en-IN"/>
@@ -2691,7 +2705,7 @@
     </p:spTree>
     <p:extLst>
       <p:ext uri="{BB962C8B-B14F-4D97-AF65-F5344CB8AC3E}">
-        <p14:creationId xmlns:p14="http://schemas.microsoft.com/office/powerpoint/2010/main" val="743166043"/>
+        <p14:creationId xmlns:p14="http://schemas.microsoft.com/office/powerpoint/2010/main" xmlns="" val="743166043"/>
       </p:ext>
     </p:extLst>
   </p:cSld>
@@ -2820,6 +2834,7 @@
           <a:p>
             <a:fld id="{5E0691F5-9D0C-4B99-AAF3-BF4DD8AE5AD6}" type="datetimeFigureOut">
               <a:rPr lang="en-IN" smtClean="0"/>
+              <a:pPr/>
               <a:t>09-02-2016</a:t>
             </a:fld>
             <a:endParaRPr lang="en-IN"/>
@@ -2862,6 +2877,7 @@
           <a:p>
             <a:fld id="{F6D66933-757C-4414-A1AA-1CEBFB93AF97}" type="slidenum">
               <a:rPr lang="en-IN" smtClean="0"/>
+              <a:pPr/>
               <a:t>‹#›</a:t>
             </a:fld>
             <a:endParaRPr lang="en-IN"/>
@@ -2871,7 +2887,7 @@
     </p:spTree>
     <p:extLst>
       <p:ext uri="{BB962C8B-B14F-4D97-AF65-F5344CB8AC3E}">
-        <p14:creationId xmlns:p14="http://schemas.microsoft.com/office/powerpoint/2010/main" val="1185054740"/>
+        <p14:creationId xmlns:p14="http://schemas.microsoft.com/office/powerpoint/2010/main" xmlns="" val="1185054740"/>
       </p:ext>
     </p:extLst>
   </p:cSld>
@@ -2990,6 +3006,7 @@
           <a:p>
             <a:fld id="{5E0691F5-9D0C-4B99-AAF3-BF4DD8AE5AD6}" type="datetimeFigureOut">
               <a:rPr lang="en-IN" smtClean="0"/>
+              <a:pPr/>
               <a:t>09-02-2016</a:t>
             </a:fld>
             <a:endParaRPr lang="en-IN"/>
@@ -3032,6 +3049,7 @@
           <a:p>
             <a:fld id="{F6D66933-757C-4414-A1AA-1CEBFB93AF97}" type="slidenum">
               <a:rPr lang="en-IN" smtClean="0"/>
+              <a:pPr/>
               <a:t>‹#›</a:t>
             </a:fld>
             <a:endParaRPr lang="en-IN"/>
@@ -3041,7 +3059,7 @@
     </p:spTree>
     <p:extLst>
       <p:ext uri="{BB962C8B-B14F-4D97-AF65-F5344CB8AC3E}">
-        <p14:creationId xmlns:p14="http://schemas.microsoft.com/office/powerpoint/2010/main" val="3602506870"/>
+        <p14:creationId xmlns:p14="http://schemas.microsoft.com/office/powerpoint/2010/main" xmlns="" val="3602506870"/>
       </p:ext>
     </p:extLst>
   </p:cSld>
@@ -3237,6 +3255,7 @@
           <a:p>
             <a:fld id="{5E0691F5-9D0C-4B99-AAF3-BF4DD8AE5AD6}" type="datetimeFigureOut">
               <a:rPr lang="en-IN" smtClean="0"/>
+              <a:pPr/>
               <a:t>09-02-2016</a:t>
             </a:fld>
             <a:endParaRPr lang="en-IN"/>
@@ -3279,6 +3298,7 @@
           <a:p>
             <a:fld id="{F6D66933-757C-4414-A1AA-1CEBFB93AF97}" type="slidenum">
               <a:rPr lang="en-IN" smtClean="0"/>
+              <a:pPr/>
               <a:t>‹#›</a:t>
             </a:fld>
             <a:endParaRPr lang="en-IN"/>
@@ -3288,7 +3308,7 @@
     </p:spTree>
     <p:extLst>
       <p:ext uri="{BB962C8B-B14F-4D97-AF65-F5344CB8AC3E}">
-        <p14:creationId xmlns:p14="http://schemas.microsoft.com/office/powerpoint/2010/main" val="2175426062"/>
+        <p14:creationId xmlns:p14="http://schemas.microsoft.com/office/powerpoint/2010/main" xmlns="" val="2175426062"/>
       </p:ext>
     </p:extLst>
   </p:cSld>
@@ -3469,6 +3489,7 @@
           <a:p>
             <a:fld id="{5E0691F5-9D0C-4B99-AAF3-BF4DD8AE5AD6}" type="datetimeFigureOut">
               <a:rPr lang="en-IN" smtClean="0"/>
+              <a:pPr/>
               <a:t>09-02-2016</a:t>
             </a:fld>
             <a:endParaRPr lang="en-IN"/>
@@ -3511,6 +3532,7 @@
           <a:p>
             <a:fld id="{F6D66933-757C-4414-A1AA-1CEBFB93AF97}" type="slidenum">
               <a:rPr lang="en-IN" smtClean="0"/>
+              <a:pPr/>
               <a:t>‹#›</a:t>
             </a:fld>
             <a:endParaRPr lang="en-IN"/>
@@ -3520,7 +3542,7 @@
     </p:spTree>
     <p:extLst>
       <p:ext uri="{BB962C8B-B14F-4D97-AF65-F5344CB8AC3E}">
-        <p14:creationId xmlns:p14="http://schemas.microsoft.com/office/powerpoint/2010/main" val="1265907016"/>
+        <p14:creationId xmlns:p14="http://schemas.microsoft.com/office/powerpoint/2010/main" xmlns="" val="1265907016"/>
       </p:ext>
     </p:extLst>
   </p:cSld>
@@ -3843,6 +3865,7 @@
           <a:p>
             <a:fld id="{5E0691F5-9D0C-4B99-AAF3-BF4DD8AE5AD6}" type="datetimeFigureOut">
               <a:rPr lang="en-IN" smtClean="0"/>
+              <a:pPr/>
               <a:t>09-02-2016</a:t>
             </a:fld>
             <a:endParaRPr lang="en-IN"/>
@@ -3885,6 +3908,7 @@
           <a:p>
             <a:fld id="{F6D66933-757C-4414-A1AA-1CEBFB93AF97}" type="slidenum">
               <a:rPr lang="en-IN" smtClean="0"/>
+              <a:pPr/>
               <a:t>‹#›</a:t>
             </a:fld>
             <a:endParaRPr lang="en-IN"/>
@@ -3894,7 +3918,7 @@
     </p:spTree>
     <p:extLst>
       <p:ext uri="{BB962C8B-B14F-4D97-AF65-F5344CB8AC3E}">
-        <p14:creationId xmlns:p14="http://schemas.microsoft.com/office/powerpoint/2010/main" val="618977615"/>
+        <p14:creationId xmlns:p14="http://schemas.microsoft.com/office/powerpoint/2010/main" xmlns="" val="618977615"/>
       </p:ext>
     </p:extLst>
   </p:cSld>
@@ -3966,6 +3990,7 @@
           <a:p>
             <a:fld id="{5E0691F5-9D0C-4B99-AAF3-BF4DD8AE5AD6}" type="datetimeFigureOut">
               <a:rPr lang="en-IN" smtClean="0"/>
+              <a:pPr/>
               <a:t>09-02-2016</a:t>
             </a:fld>
             <a:endParaRPr lang="en-IN"/>
@@ -4008,6 +4033,7 @@
           <a:p>
             <a:fld id="{F6D66933-757C-4414-A1AA-1CEBFB93AF97}" type="slidenum">
               <a:rPr lang="en-IN" smtClean="0"/>
+              <a:pPr/>
               <a:t>‹#›</a:t>
             </a:fld>
             <a:endParaRPr lang="en-IN"/>
@@ -4017,7 +4043,7 @@
     </p:spTree>
     <p:extLst>
       <p:ext uri="{BB962C8B-B14F-4D97-AF65-F5344CB8AC3E}">
-        <p14:creationId xmlns:p14="http://schemas.microsoft.com/office/powerpoint/2010/main" val="3986691130"/>
+        <p14:creationId xmlns:p14="http://schemas.microsoft.com/office/powerpoint/2010/main" xmlns="" val="3986691130"/>
       </p:ext>
     </p:extLst>
   </p:cSld>
@@ -4061,6 +4087,7 @@
           <a:p>
             <a:fld id="{5E0691F5-9D0C-4B99-AAF3-BF4DD8AE5AD6}" type="datetimeFigureOut">
               <a:rPr lang="en-IN" smtClean="0"/>
+              <a:pPr/>
               <a:t>09-02-2016</a:t>
             </a:fld>
             <a:endParaRPr lang="en-IN"/>
@@ -4103,6 +4130,7 @@
           <a:p>
             <a:fld id="{F6D66933-757C-4414-A1AA-1CEBFB93AF97}" type="slidenum">
               <a:rPr lang="en-IN" smtClean="0"/>
+              <a:pPr/>
               <a:t>‹#›</a:t>
             </a:fld>
             <a:endParaRPr lang="en-IN"/>
@@ -4112,7 +4140,7 @@
     </p:spTree>
     <p:extLst>
       <p:ext uri="{BB962C8B-B14F-4D97-AF65-F5344CB8AC3E}">
-        <p14:creationId xmlns:p14="http://schemas.microsoft.com/office/powerpoint/2010/main" val="2293448865"/>
+        <p14:creationId xmlns:p14="http://schemas.microsoft.com/office/powerpoint/2010/main" xmlns="" val="2293448865"/>
       </p:ext>
     </p:extLst>
   </p:cSld>
@@ -4316,6 +4344,7 @@
           <a:p>
             <a:fld id="{5E0691F5-9D0C-4B99-AAF3-BF4DD8AE5AD6}" type="datetimeFigureOut">
               <a:rPr lang="en-IN" smtClean="0"/>
+              <a:pPr/>
               <a:t>09-02-2016</a:t>
             </a:fld>
             <a:endParaRPr lang="en-IN"/>
@@ -4358,6 +4387,7 @@
           <a:p>
             <a:fld id="{F6D66933-757C-4414-A1AA-1CEBFB93AF97}" type="slidenum">
               <a:rPr lang="en-IN" smtClean="0"/>
+              <a:pPr/>
               <a:t>‹#›</a:t>
             </a:fld>
             <a:endParaRPr lang="en-IN"/>
@@ -4367,7 +4397,7 @@
     </p:spTree>
     <p:extLst>
       <p:ext uri="{BB962C8B-B14F-4D97-AF65-F5344CB8AC3E}">
-        <p14:creationId xmlns:p14="http://schemas.microsoft.com/office/powerpoint/2010/main" val="4242348760"/>
+        <p14:creationId xmlns:p14="http://schemas.microsoft.com/office/powerpoint/2010/main" xmlns="" val="4242348760"/>
       </p:ext>
     </p:extLst>
   </p:cSld>
@@ -4598,6 +4628,7 @@
           <a:p>
             <a:fld id="{F6D66933-757C-4414-A1AA-1CEBFB93AF97}" type="slidenum">
               <a:rPr lang="en-IN" smtClean="0"/>
+              <a:pPr/>
               <a:t>‹#›</a:t>
             </a:fld>
             <a:endParaRPr lang="en-IN"/>
@@ -4621,6 +4652,7 @@
           <a:p>
             <a:fld id="{5E0691F5-9D0C-4B99-AAF3-BF4DD8AE5AD6}" type="datetimeFigureOut">
               <a:rPr lang="en-IN" smtClean="0"/>
+              <a:pPr/>
               <a:t>09-02-2016</a:t>
             </a:fld>
             <a:endParaRPr lang="en-IN"/>
@@ -4630,7 +4662,7 @@
     </p:spTree>
     <p:extLst>
       <p:ext uri="{BB962C8B-B14F-4D97-AF65-F5344CB8AC3E}">
-        <p14:creationId xmlns:p14="http://schemas.microsoft.com/office/powerpoint/2010/main" val="1810002345"/>
+        <p14:creationId xmlns:p14="http://schemas.microsoft.com/office/powerpoint/2010/main" xmlns="" val="1810002345"/>
       </p:ext>
     </p:extLst>
   </p:cSld>
@@ -5323,6 +5355,7 @@
           <a:p>
             <a:fld id="{5E0691F5-9D0C-4B99-AAF3-BF4DD8AE5AD6}" type="datetimeFigureOut">
               <a:rPr lang="en-IN" smtClean="0"/>
+              <a:pPr/>
               <a:t>09-02-2016</a:t>
             </a:fld>
             <a:endParaRPr lang="en-IN"/>
@@ -5399,6 +5432,7 @@
           <a:p>
             <a:fld id="{F6D66933-757C-4414-A1AA-1CEBFB93AF97}" type="slidenum">
               <a:rPr lang="en-IN" smtClean="0"/>
+              <a:pPr/>
               <a:t>‹#›</a:t>
             </a:fld>
             <a:endParaRPr lang="en-IN"/>
@@ -5408,7 +5442,7 @@
     </p:spTree>
     <p:extLst>
       <p:ext uri="{BB962C8B-B14F-4D97-AF65-F5344CB8AC3E}">
-        <p14:creationId xmlns:p14="http://schemas.microsoft.com/office/powerpoint/2010/main" val="854385474"/>
+        <p14:creationId xmlns:p14="http://schemas.microsoft.com/office/powerpoint/2010/main" xmlns="" val="854385474"/>
       </p:ext>
     </p:extLst>
   </p:cSld>
@@ -6094,7 +6128,7 @@
     </p:spTree>
     <p:extLst>
       <p:ext uri="{BB962C8B-B14F-4D97-AF65-F5344CB8AC3E}">
-        <p14:creationId xmlns:p14="http://schemas.microsoft.com/office/powerpoint/2010/main" val="1646587919"/>
+        <p14:creationId xmlns:p14="http://schemas.microsoft.com/office/powerpoint/2010/main" xmlns="" val="1646587919"/>
       </p:ext>
     </p:extLst>
   </p:cSld>
@@ -6223,7 +6257,7 @@
     </p:spTree>
     <p:extLst>
       <p:ext uri="{BB962C8B-B14F-4D97-AF65-F5344CB8AC3E}">
-        <p14:creationId xmlns:p14="http://schemas.microsoft.com/office/powerpoint/2010/main" val="1665069484"/>
+        <p14:creationId xmlns:p14="http://schemas.microsoft.com/office/powerpoint/2010/main" xmlns="" val="1665069484"/>
       </p:ext>
     </p:extLst>
   </p:cSld>
@@ -6476,7 +6510,7 @@
     </p:spTree>
     <p:extLst>
       <p:ext uri="{BB962C8B-B14F-4D97-AF65-F5344CB8AC3E}">
-        <p14:creationId xmlns:p14="http://schemas.microsoft.com/office/powerpoint/2010/main" val="4023520249"/>
+        <p14:creationId xmlns:p14="http://schemas.microsoft.com/office/powerpoint/2010/main" xmlns="" val="4023520249"/>
       </p:ext>
     </p:extLst>
   </p:cSld>
@@ -6628,7 +6662,7 @@
     </p:spTree>
     <p:extLst>
       <p:ext uri="{BB962C8B-B14F-4D97-AF65-F5344CB8AC3E}">
-        <p14:creationId xmlns:p14="http://schemas.microsoft.com/office/powerpoint/2010/main" val="1439879549"/>
+        <p14:creationId xmlns:p14="http://schemas.microsoft.com/office/powerpoint/2010/main" xmlns="" val="1439879549"/>
       </p:ext>
     </p:extLst>
   </p:cSld>
@@ -6835,7 +6869,7 @@
     </p:spTree>
     <p:extLst>
       <p:ext uri="{BB962C8B-B14F-4D97-AF65-F5344CB8AC3E}">
-        <p14:creationId xmlns:p14="http://schemas.microsoft.com/office/powerpoint/2010/main" val="2315167525"/>
+        <p14:creationId xmlns:p14="http://schemas.microsoft.com/office/powerpoint/2010/main" xmlns="" val="2315167525"/>
       </p:ext>
     </p:extLst>
   </p:cSld>
@@ -6872,9 +6906,19 @@
         </p:nvPicPr>
         <p:blipFill>
           <a:blip r:embed="rId2">
+            <a:clrChange>
+              <a:clrFrom>
+                <a:srgbClr val="FFFFFF"/>
+              </a:clrFrom>
+              <a:clrTo>
+                <a:srgbClr val="FFFFFF">
+                  <a:alpha val="0"/>
+                </a:srgbClr>
+              </a:clrTo>
+            </a:clrChange>
             <a:extLst>
               <a:ext uri="{28A0092B-C50C-407E-A947-70E740481C1C}">
-                <a14:useLocalDpi xmlns:a14="http://schemas.microsoft.com/office/drawing/2010/main" val="0"/>
+                <a14:useLocalDpi xmlns:a14="http://schemas.microsoft.com/office/drawing/2010/main" xmlns="" val="0"/>
               </a:ext>
             </a:extLst>
           </a:blip>
@@ -6884,7 +6928,7 @@
         </p:blipFill>
         <p:spPr>
           <a:xfrm>
-            <a:off x="270506" y="623894"/>
+            <a:off x="310550" y="538791"/>
             <a:ext cx="10702294" cy="5394769"/>
           </a:xfrm>
           <a:prstGeom prst="rect">
@@ -6895,7 +6939,7 @@
     </p:spTree>
     <p:extLst>
       <p:ext uri="{BB962C8B-B14F-4D97-AF65-F5344CB8AC3E}">
-        <p14:creationId xmlns:p14="http://schemas.microsoft.com/office/powerpoint/2010/main" val="2554526102"/>
+        <p14:creationId xmlns:p14="http://schemas.microsoft.com/office/powerpoint/2010/main" xmlns="" val="2554526102"/>
       </p:ext>
     </p:extLst>
   </p:cSld>
@@ -7217,7 +7261,7 @@
     </p:spTree>
     <p:extLst>
       <p:ext uri="{BB962C8B-B14F-4D97-AF65-F5344CB8AC3E}">
-        <p14:creationId xmlns:p14="http://schemas.microsoft.com/office/powerpoint/2010/main" val="889664965"/>
+        <p14:creationId xmlns:p14="http://schemas.microsoft.com/office/powerpoint/2010/main" xmlns="" val="889664965"/>
       </p:ext>
     </p:extLst>
   </p:cSld>
@@ -7295,16 +7339,6 @@
               </a:rPr>
               <a:t>CSS </a:t>
             </a:r>
-            <a:endParaRPr lang="en-IN" sz="3000" dirty="0" smtClean="0">
-              <a:solidFill>
-                <a:schemeClr val="accent2">
-                  <a:lumMod val="60000"/>
-                  <a:lumOff val="40000"/>
-                </a:schemeClr>
-              </a:solidFill>
-              <a:latin typeface="Times New Roman" panose="02020603050405020304" pitchFamily="18" charset="0"/>
-              <a:cs typeface="Times New Roman" panose="02020603050405020304" pitchFamily="18" charset="0"/>
-            </a:endParaRPr>
           </a:p>
           <a:p>
             <a:pPr marL="0" indent="0">
@@ -7334,14 +7368,7 @@
                 <a:latin typeface="Times New Roman" panose="02020603050405020304" pitchFamily="18" charset="0"/>
                 <a:cs typeface="Times New Roman" panose="02020603050405020304" pitchFamily="18" charset="0"/>
               </a:rPr>
-              <a:t>CSS </a:t>
-            </a:r>
-            <a:r>
-              <a:rPr lang="en-IN" sz="2400" dirty="0" smtClean="0">
-                <a:latin typeface="Times New Roman" panose="02020603050405020304" pitchFamily="18" charset="0"/>
-                <a:cs typeface="Times New Roman" panose="02020603050405020304" pitchFamily="18" charset="0"/>
-              </a:rPr>
-              <a:t>is used to style the web page .</a:t>
+              <a:t>CSS is used to style the web page .</a:t>
             </a:r>
           </a:p>
           <a:p>
@@ -7448,7 +7475,7 @@
     </p:spTree>
     <p:extLst>
       <p:ext uri="{BB962C8B-B14F-4D97-AF65-F5344CB8AC3E}">
-        <p14:creationId xmlns:p14="http://schemas.microsoft.com/office/powerpoint/2010/main" val="2475605198"/>
+        <p14:creationId xmlns:p14="http://schemas.microsoft.com/office/powerpoint/2010/main" xmlns="" val="2475605198"/>
       </p:ext>
     </p:extLst>
   </p:cSld>
@@ -7547,7 +7574,7 @@
     </p:spTree>
     <p:extLst>
       <p:ext uri="{BB962C8B-B14F-4D97-AF65-F5344CB8AC3E}">
-        <p14:creationId xmlns:p14="http://schemas.microsoft.com/office/powerpoint/2010/main" val="1829217413"/>
+        <p14:creationId xmlns:p14="http://schemas.microsoft.com/office/powerpoint/2010/main" xmlns="" val="1829217413"/>
       </p:ext>
     </p:extLst>
   </p:cSld>
@@ -7600,7 +7627,7 @@
     </a:clrScheme>
     <a:fontScheme name="Facet">
       <a:majorFont>
-        <a:latin typeface="Trebuchet MS" panose="020B0603020202020204"/>
+        <a:latin typeface="Trebuchet MS"/>
         <a:ea typeface=""/>
         <a:cs typeface=""/>
         <a:font script="Jpan" typeface="メイリオ"/>
@@ -7635,7 +7662,7 @@
         <a:font script="Geor" typeface="Sylfaen"/>
       </a:majorFont>
       <a:minorFont>
-        <a:latin typeface="Trebuchet MS" panose="020B0603020202020204"/>
+        <a:latin typeface="Trebuchet MS"/>
         <a:ea typeface=""/>
         <a:cs typeface=""/>
         <a:font script="Jpan" typeface="メイリオ"/>
@@ -7808,7 +7835,7 @@
   <a:extraClrSchemeLst/>
   <a:extLst>
     <a:ext uri="{05A4C25C-085E-4340-85A3-A5531E510DB2}">
-      <thm15:themeFamily xmlns:thm15="http://schemas.microsoft.com/office/thememl/2012/main" name="Facet" id="{C0C680CD-088A-49FC-A102-D699147F32B2}" vid="{0B5AB586-D108-4FC1-8368-649FE654B894}"/>
+      <thm15:themeFamily xmlns:thm15="http://schemas.microsoft.com/office/thememl/2012/main" xmlns="" name="Facet" id="{C0C680CD-088A-49FC-A102-D699147F32B2}" vid="{0B5AB586-D108-4FC1-8368-649FE654B894}"/>
     </a:ext>
   </a:extLst>
 </a:theme>

</xml_diff>

<commit_message>
Added System Arch Diagram and details to ppt
</commit_message>
<xml_diff>
--- a/docs/HAD project.pptx
+++ b/docs/HAD project.pptx
@@ -123,7 +123,7 @@
   </p:defaultTextStyle>
   <p:extLst>
     <p:ext uri="{EFAFB233-063F-42B5-8137-9DF3F51BA10A}">
-      <p15:sldGuideLst xmlns:p15="http://schemas.microsoft.com/office/powerpoint/2012/main" xmlns=""/>
+      <p15:sldGuideLst xmlns="" xmlns:p15="http://schemas.microsoft.com/office/powerpoint/2012/main"/>
     </p:ext>
   </p:extLst>
 </p:presentation>
@@ -1010,6 +1010,13 @@
         </dgm:presLayoutVars>
       </dgm:prSet>
       <dgm:spPr/>
+      <dgm:t>
+        <a:bodyPr/>
+        <a:lstStyle/>
+        <a:p>
+          <a:endParaRPr lang="en-IN"/>
+        </a:p>
+      </dgm:t>
     </dgm:pt>
     <dgm:pt modelId="{21C0C951-536D-4A3F-B601-0A3EF4D63AC2}" type="pres">
       <dgm:prSet presAssocID="{2C30F772-69EA-4818-8B40-953945D49393}" presName="dummyMaxCanvas" presStyleCnt="0">
@@ -1069,6 +1076,13 @@
         </dgm:presLayoutVars>
       </dgm:prSet>
       <dgm:spPr/>
+      <dgm:t>
+        <a:bodyPr/>
+        <a:lstStyle/>
+        <a:p>
+          <a:endParaRPr lang="en-IN"/>
+        </a:p>
+      </dgm:t>
     </dgm:pt>
     <dgm:pt modelId="{6FE4BB4A-A4D0-4181-A7EA-FFE2ECB1A3D0}" type="pres">
       <dgm:prSet presAssocID="{2C30F772-69EA-4818-8B40-953945D49393}" presName="ThreeConn_2-3" presStyleLbl="fgAccFollowNode1" presStyleIdx="1" presStyleCnt="2">
@@ -1077,6 +1091,13 @@
         </dgm:presLayoutVars>
       </dgm:prSet>
       <dgm:spPr/>
+      <dgm:t>
+        <a:bodyPr/>
+        <a:lstStyle/>
+        <a:p>
+          <a:endParaRPr lang="en-IN"/>
+        </a:p>
+      </dgm:t>
     </dgm:pt>
     <dgm:pt modelId="{464660D7-9C34-4D6C-9B7F-52B6AEEE847E}" type="pres">
       <dgm:prSet presAssocID="{2C30F772-69EA-4818-8B40-953945D49393}" presName="ThreeNodes_1_text" presStyleLbl="node1" presStyleIdx="2" presStyleCnt="3">
@@ -1125,18 +1146,18 @@
     </dgm:pt>
   </dgm:ptLst>
   <dgm:cxnLst>
+    <dgm:cxn modelId="{5FEF4B33-3F5F-4067-B4A7-AEBEB1FABFCF}" type="presOf" srcId="{23CFFF57-82AB-4C5A-8916-E3680249A62A}" destId="{BBE7DE13-8F56-4C4C-9E4B-A18CA0A67CFB}" srcOrd="1" destOrd="0" presId="urn:microsoft.com/office/officeart/2005/8/layout/vProcess5"/>
+    <dgm:cxn modelId="{30D3B1E7-93FD-412F-A41A-6A65493F1983}" srcId="{2C30F772-69EA-4818-8B40-953945D49393}" destId="{629842FB-B705-48E9-A76F-7C26CDA88EC2}" srcOrd="1" destOrd="0" parTransId="{2EF092FA-24BA-4216-B90C-8C196E4511C3}" sibTransId="{18EDC6FE-C9E0-4437-A86B-BECA03A811E8}"/>
+    <dgm:cxn modelId="{A39FEB9E-15FA-48FC-B4CD-5EFD62C151B1}" srcId="{2C30F772-69EA-4818-8B40-953945D49393}" destId="{23CFFF57-82AB-4C5A-8916-E3680249A62A}" srcOrd="2" destOrd="0" parTransId="{811EBBF1-F132-4475-936B-AB3ABEDF6084}" sibTransId="{649C0F16-FDAE-46CF-82D0-9682B9F4805E}"/>
+    <dgm:cxn modelId="{E3F3996E-09E5-4CB8-8D53-08FEB3D254C6}" srcId="{2C30F772-69EA-4818-8B40-953945D49393}" destId="{63A8D8A4-D7E9-4BF2-90BF-82775F8C8217}" srcOrd="0" destOrd="0" parTransId="{C354A89E-6FC4-4850-9CAD-B17CA62086C3}" sibTransId="{96DFB6DC-7794-45A1-A7FA-33D60DF69E59}"/>
+    <dgm:cxn modelId="{3E7B60B5-699D-4C06-B4CF-5C6C14C462F6}" type="presOf" srcId="{629842FB-B705-48E9-A76F-7C26CDA88EC2}" destId="{562D0CDB-DA38-4686-9112-CB97205C9B3C}" srcOrd="1" destOrd="0" presId="urn:microsoft.com/office/officeart/2005/8/layout/vProcess5"/>
+    <dgm:cxn modelId="{809B43DF-F126-4513-A1F8-A2D7F6150D4D}" type="presOf" srcId="{63A8D8A4-D7E9-4BF2-90BF-82775F8C8217}" destId="{464660D7-9C34-4D6C-9B7F-52B6AEEE847E}" srcOrd="1" destOrd="0" presId="urn:microsoft.com/office/officeart/2005/8/layout/vProcess5"/>
     <dgm:cxn modelId="{137B49D9-B4F2-4A1C-88E2-10B83DC6544E}" type="presOf" srcId="{18EDC6FE-C9E0-4437-A86B-BECA03A811E8}" destId="{6FE4BB4A-A4D0-4181-A7EA-FFE2ECB1A3D0}" srcOrd="0" destOrd="0" presId="urn:microsoft.com/office/officeart/2005/8/layout/vProcess5"/>
-    <dgm:cxn modelId="{809B43DF-F126-4513-A1F8-A2D7F6150D4D}" type="presOf" srcId="{63A8D8A4-D7E9-4BF2-90BF-82775F8C8217}" destId="{464660D7-9C34-4D6C-9B7F-52B6AEEE847E}" srcOrd="1" destOrd="0" presId="urn:microsoft.com/office/officeart/2005/8/layout/vProcess5"/>
-    <dgm:cxn modelId="{80E0F94D-4230-4424-B989-0DEA05E93EAE}" type="presOf" srcId="{63A8D8A4-D7E9-4BF2-90BF-82775F8C8217}" destId="{641BAC4E-9BE8-4D6A-8CB2-6A9FA6369FF4}" srcOrd="0" destOrd="0" presId="urn:microsoft.com/office/officeart/2005/8/layout/vProcess5"/>
-    <dgm:cxn modelId="{EA59985F-E001-4F53-86BB-5F6E29688A33}" type="presOf" srcId="{96DFB6DC-7794-45A1-A7FA-33D60DF69E59}" destId="{5D8751E0-A5E6-45E1-8F71-D42383EF1CDC}" srcOrd="0" destOrd="0" presId="urn:microsoft.com/office/officeart/2005/8/layout/vProcess5"/>
-    <dgm:cxn modelId="{5FEF4B33-3F5F-4067-B4A7-AEBEB1FABFCF}" type="presOf" srcId="{23CFFF57-82AB-4C5A-8916-E3680249A62A}" destId="{BBE7DE13-8F56-4C4C-9E4B-A18CA0A67CFB}" srcOrd="1" destOrd="0" presId="urn:microsoft.com/office/officeart/2005/8/layout/vProcess5"/>
-    <dgm:cxn modelId="{A39FEB9E-15FA-48FC-B4CD-5EFD62C151B1}" srcId="{2C30F772-69EA-4818-8B40-953945D49393}" destId="{23CFFF57-82AB-4C5A-8916-E3680249A62A}" srcOrd="2" destOrd="0" parTransId="{811EBBF1-F132-4475-936B-AB3ABEDF6084}" sibTransId="{649C0F16-FDAE-46CF-82D0-9682B9F4805E}"/>
-    <dgm:cxn modelId="{45F0D139-3FD5-41C5-A342-B41072809AD3}" type="presOf" srcId="{2C30F772-69EA-4818-8B40-953945D49393}" destId="{97C37993-3BF4-4F32-99CE-25F3CCE5A3F6}" srcOrd="0" destOrd="0" presId="urn:microsoft.com/office/officeart/2005/8/layout/vProcess5"/>
-    <dgm:cxn modelId="{E3F3996E-09E5-4CB8-8D53-08FEB3D254C6}" srcId="{2C30F772-69EA-4818-8B40-953945D49393}" destId="{63A8D8A4-D7E9-4BF2-90BF-82775F8C8217}" srcOrd="0" destOrd="0" parTransId="{C354A89E-6FC4-4850-9CAD-B17CA62086C3}" sibTransId="{96DFB6DC-7794-45A1-A7FA-33D60DF69E59}"/>
-    <dgm:cxn modelId="{30D3B1E7-93FD-412F-A41A-6A65493F1983}" srcId="{2C30F772-69EA-4818-8B40-953945D49393}" destId="{629842FB-B705-48E9-A76F-7C26CDA88EC2}" srcOrd="1" destOrd="0" parTransId="{2EF092FA-24BA-4216-B90C-8C196E4511C3}" sibTransId="{18EDC6FE-C9E0-4437-A86B-BECA03A811E8}"/>
-    <dgm:cxn modelId="{3E7B60B5-699D-4C06-B4CF-5C6C14C462F6}" type="presOf" srcId="{629842FB-B705-48E9-A76F-7C26CDA88EC2}" destId="{562D0CDB-DA38-4686-9112-CB97205C9B3C}" srcOrd="1" destOrd="0" presId="urn:microsoft.com/office/officeart/2005/8/layout/vProcess5"/>
     <dgm:cxn modelId="{0A3EC74F-19E2-4976-B36C-07E1CBFA9260}" type="presOf" srcId="{629842FB-B705-48E9-A76F-7C26CDA88EC2}" destId="{9CE68F4D-E14E-46D5-8C1A-E50051EDCF4E}" srcOrd="0" destOrd="0" presId="urn:microsoft.com/office/officeart/2005/8/layout/vProcess5"/>
     <dgm:cxn modelId="{BEC213E6-0CFC-4888-B6FD-AD2EA67C661E}" type="presOf" srcId="{23CFFF57-82AB-4C5A-8916-E3680249A62A}" destId="{05654473-83E8-4392-9D4A-BF4548A361E9}" srcOrd="0" destOrd="0" presId="urn:microsoft.com/office/officeart/2005/8/layout/vProcess5"/>
+    <dgm:cxn modelId="{EA59985F-E001-4F53-86BB-5F6E29688A33}" type="presOf" srcId="{96DFB6DC-7794-45A1-A7FA-33D60DF69E59}" destId="{5D8751E0-A5E6-45E1-8F71-D42383EF1CDC}" srcOrd="0" destOrd="0" presId="urn:microsoft.com/office/officeart/2005/8/layout/vProcess5"/>
+    <dgm:cxn modelId="{45F0D139-3FD5-41C5-A342-B41072809AD3}" type="presOf" srcId="{2C30F772-69EA-4818-8B40-953945D49393}" destId="{97C37993-3BF4-4F32-99CE-25F3CCE5A3F6}" srcOrd="0" destOrd="0" presId="urn:microsoft.com/office/officeart/2005/8/layout/vProcess5"/>
+    <dgm:cxn modelId="{80E0F94D-4230-4424-B989-0DEA05E93EAE}" type="presOf" srcId="{63A8D8A4-D7E9-4BF2-90BF-82775F8C8217}" destId="{641BAC4E-9BE8-4D6A-8CB2-6A9FA6369FF4}" srcOrd="0" destOrd="0" presId="urn:microsoft.com/office/officeart/2005/8/layout/vProcess5"/>
     <dgm:cxn modelId="{2E7C6B18-8A68-4947-9013-654CD7DCDB56}" type="presParOf" srcId="{97C37993-3BF4-4F32-99CE-25F3CCE5A3F6}" destId="{21C0C951-536D-4A3F-B601-0A3EF4D63AC2}" srcOrd="0" destOrd="0" presId="urn:microsoft.com/office/officeart/2005/8/layout/vProcess5"/>
     <dgm:cxn modelId="{EAF00864-AE9A-4B73-9451-A8B9FA9B9EE2}" type="presParOf" srcId="{97C37993-3BF4-4F32-99CE-25F3CCE5A3F6}" destId="{641BAC4E-9BE8-4D6A-8CB2-6A9FA6369FF4}" srcOrd="1" destOrd="0" presId="urn:microsoft.com/office/officeart/2005/8/layout/vProcess5"/>
     <dgm:cxn modelId="{6657EFC8-53A8-454B-8617-B98E5D931306}" type="presParOf" srcId="{97C37993-3BF4-4F32-99CE-25F3CCE5A3F6}" destId="{9CE68F4D-E14E-46D5-8C1A-E50051EDCF4E}" srcOrd="2" destOrd="0" presId="urn:microsoft.com/office/officeart/2005/8/layout/vProcess5"/>
@@ -4158,7 +4179,7 @@
             <a:fld id="{5E0691F5-9D0C-4B99-AAF3-BF4DD8AE5AD6}" type="datetimeFigureOut">
               <a:rPr lang="en-IN" smtClean="0"/>
               <a:pPr/>
-              <a:t>24-02-2016</a:t>
+              <a:t>25-02-2016</a:t>
             </a:fld>
             <a:endParaRPr lang="en-IN"/>
           </a:p>
@@ -4210,7 +4231,7 @@
     </p:spTree>
     <p:extLst>
       <p:ext uri="{BB962C8B-B14F-4D97-AF65-F5344CB8AC3E}">
-        <p14:creationId xmlns:p14="http://schemas.microsoft.com/office/powerpoint/2010/main" xmlns="" val="745236216"/>
+        <p14:creationId xmlns="" xmlns:p14="http://schemas.microsoft.com/office/powerpoint/2010/main" val="745236216"/>
       </p:ext>
     </p:extLst>
   </p:cSld>
@@ -4411,7 +4432,7 @@
             <a:fld id="{5E0691F5-9D0C-4B99-AAF3-BF4DD8AE5AD6}" type="datetimeFigureOut">
               <a:rPr lang="en-IN" smtClean="0"/>
               <a:pPr/>
-              <a:t>24-02-2016</a:t>
+              <a:t>25-02-2016</a:t>
             </a:fld>
             <a:endParaRPr lang="en-IN"/>
           </a:p>
@@ -4463,7 +4484,7 @@
     </p:spTree>
     <p:extLst>
       <p:ext uri="{BB962C8B-B14F-4D97-AF65-F5344CB8AC3E}">
-        <p14:creationId xmlns:p14="http://schemas.microsoft.com/office/powerpoint/2010/main" xmlns="" val="2293863678"/>
+        <p14:creationId xmlns="" xmlns:p14="http://schemas.microsoft.com/office/powerpoint/2010/main" val="2293863678"/>
       </p:ext>
     </p:extLst>
   </p:cSld>
@@ -4727,7 +4748,7 @@
             <a:fld id="{5E0691F5-9D0C-4B99-AAF3-BF4DD8AE5AD6}" type="datetimeFigureOut">
               <a:rPr lang="en-IN" smtClean="0"/>
               <a:pPr/>
-              <a:t>24-02-2016</a:t>
+              <a:t>25-02-2016</a:t>
             </a:fld>
             <a:endParaRPr lang="en-IN"/>
           </a:p>
@@ -4861,7 +4882,7 @@
     </p:spTree>
     <p:extLst>
       <p:ext uri="{BB962C8B-B14F-4D97-AF65-F5344CB8AC3E}">
-        <p14:creationId xmlns:p14="http://schemas.microsoft.com/office/powerpoint/2010/main" xmlns="" val="3646211488"/>
+        <p14:creationId xmlns="" xmlns:p14="http://schemas.microsoft.com/office/powerpoint/2010/main" val="3646211488"/>
       </p:ext>
     </p:extLst>
   </p:cSld>
@@ -5062,7 +5083,7 @@
             <a:fld id="{5E0691F5-9D0C-4B99-AAF3-BF4DD8AE5AD6}" type="datetimeFigureOut">
               <a:rPr lang="en-IN" smtClean="0"/>
               <a:pPr/>
-              <a:t>24-02-2016</a:t>
+              <a:t>25-02-2016</a:t>
             </a:fld>
             <a:endParaRPr lang="en-IN"/>
           </a:p>
@@ -5114,7 +5135,7 @@
     </p:spTree>
     <p:extLst>
       <p:ext uri="{BB962C8B-B14F-4D97-AF65-F5344CB8AC3E}">
-        <p14:creationId xmlns:p14="http://schemas.microsoft.com/office/powerpoint/2010/main" xmlns="" val="130304460"/>
+        <p14:creationId xmlns="" xmlns:p14="http://schemas.microsoft.com/office/powerpoint/2010/main" val="130304460"/>
       </p:ext>
     </p:extLst>
   </p:cSld>
@@ -5378,7 +5399,7 @@
             <a:fld id="{5E0691F5-9D0C-4B99-AAF3-BF4DD8AE5AD6}" type="datetimeFigureOut">
               <a:rPr lang="en-IN" smtClean="0"/>
               <a:pPr/>
-              <a:t>24-02-2016</a:t>
+              <a:t>25-02-2016</a:t>
             </a:fld>
             <a:endParaRPr lang="en-IN"/>
           </a:p>
@@ -5512,7 +5533,7 @@
     </p:spTree>
     <p:extLst>
       <p:ext uri="{BB962C8B-B14F-4D97-AF65-F5344CB8AC3E}">
-        <p14:creationId xmlns:p14="http://schemas.microsoft.com/office/powerpoint/2010/main" xmlns="" val="988258245"/>
+        <p14:creationId xmlns="" xmlns:p14="http://schemas.microsoft.com/office/powerpoint/2010/main" val="988258245"/>
       </p:ext>
     </p:extLst>
   </p:cSld>
@@ -5773,7 +5794,7 @@
             <a:fld id="{5E0691F5-9D0C-4B99-AAF3-BF4DD8AE5AD6}" type="datetimeFigureOut">
               <a:rPr lang="en-IN" smtClean="0"/>
               <a:pPr/>
-              <a:t>24-02-2016</a:t>
+              <a:t>25-02-2016</a:t>
             </a:fld>
             <a:endParaRPr lang="en-IN"/>
           </a:p>
@@ -5825,7 +5846,7 @@
     </p:spTree>
     <p:extLst>
       <p:ext uri="{BB962C8B-B14F-4D97-AF65-F5344CB8AC3E}">
-        <p14:creationId xmlns:p14="http://schemas.microsoft.com/office/powerpoint/2010/main" xmlns="" val="1129624647"/>
+        <p14:creationId xmlns="" xmlns:p14="http://schemas.microsoft.com/office/powerpoint/2010/main" val="1129624647"/>
       </p:ext>
     </p:extLst>
   </p:cSld>
@@ -5945,7 +5966,7 @@
             <a:fld id="{5E0691F5-9D0C-4B99-AAF3-BF4DD8AE5AD6}" type="datetimeFigureOut">
               <a:rPr lang="en-IN" smtClean="0"/>
               <a:pPr/>
-              <a:t>24-02-2016</a:t>
+              <a:t>25-02-2016</a:t>
             </a:fld>
             <a:endParaRPr lang="en-IN"/>
           </a:p>
@@ -5997,7 +6018,7 @@
     </p:spTree>
     <p:extLst>
       <p:ext uri="{BB962C8B-B14F-4D97-AF65-F5344CB8AC3E}">
-        <p14:creationId xmlns:p14="http://schemas.microsoft.com/office/powerpoint/2010/main" xmlns="" val="743166043"/>
+        <p14:creationId xmlns="" xmlns:p14="http://schemas.microsoft.com/office/powerpoint/2010/main" val="743166043"/>
       </p:ext>
     </p:extLst>
   </p:cSld>
@@ -6127,7 +6148,7 @@
             <a:fld id="{5E0691F5-9D0C-4B99-AAF3-BF4DD8AE5AD6}" type="datetimeFigureOut">
               <a:rPr lang="en-IN" smtClean="0"/>
               <a:pPr/>
-              <a:t>24-02-2016</a:t>
+              <a:t>25-02-2016</a:t>
             </a:fld>
             <a:endParaRPr lang="en-IN"/>
           </a:p>
@@ -6179,7 +6200,7 @@
     </p:spTree>
     <p:extLst>
       <p:ext uri="{BB962C8B-B14F-4D97-AF65-F5344CB8AC3E}">
-        <p14:creationId xmlns:p14="http://schemas.microsoft.com/office/powerpoint/2010/main" xmlns="" val="1185054740"/>
+        <p14:creationId xmlns="" xmlns:p14="http://schemas.microsoft.com/office/powerpoint/2010/main" val="1185054740"/>
       </p:ext>
     </p:extLst>
   </p:cSld>
@@ -6299,7 +6320,7 @@
             <a:fld id="{5E0691F5-9D0C-4B99-AAF3-BF4DD8AE5AD6}" type="datetimeFigureOut">
               <a:rPr lang="en-IN" smtClean="0"/>
               <a:pPr/>
-              <a:t>24-02-2016</a:t>
+              <a:t>25-02-2016</a:t>
             </a:fld>
             <a:endParaRPr lang="en-IN"/>
           </a:p>
@@ -6351,7 +6372,7 @@
     </p:spTree>
     <p:extLst>
       <p:ext uri="{BB962C8B-B14F-4D97-AF65-F5344CB8AC3E}">
-        <p14:creationId xmlns:p14="http://schemas.microsoft.com/office/powerpoint/2010/main" xmlns="" val="3602506870"/>
+        <p14:creationId xmlns="" xmlns:p14="http://schemas.microsoft.com/office/powerpoint/2010/main" val="3602506870"/>
       </p:ext>
     </p:extLst>
   </p:cSld>
@@ -6548,7 +6569,7 @@
             <a:fld id="{5E0691F5-9D0C-4B99-AAF3-BF4DD8AE5AD6}" type="datetimeFigureOut">
               <a:rPr lang="en-IN" smtClean="0"/>
               <a:pPr/>
-              <a:t>24-02-2016</a:t>
+              <a:t>25-02-2016</a:t>
             </a:fld>
             <a:endParaRPr lang="en-IN"/>
           </a:p>
@@ -6600,7 +6621,7 @@
     </p:spTree>
     <p:extLst>
       <p:ext uri="{BB962C8B-B14F-4D97-AF65-F5344CB8AC3E}">
-        <p14:creationId xmlns:p14="http://schemas.microsoft.com/office/powerpoint/2010/main" xmlns="" val="2175426062"/>
+        <p14:creationId xmlns="" xmlns:p14="http://schemas.microsoft.com/office/powerpoint/2010/main" val="2175426062"/>
       </p:ext>
     </p:extLst>
   </p:cSld>
@@ -6782,7 +6803,7 @@
             <a:fld id="{5E0691F5-9D0C-4B99-AAF3-BF4DD8AE5AD6}" type="datetimeFigureOut">
               <a:rPr lang="en-IN" smtClean="0"/>
               <a:pPr/>
-              <a:t>24-02-2016</a:t>
+              <a:t>25-02-2016</a:t>
             </a:fld>
             <a:endParaRPr lang="en-IN"/>
           </a:p>
@@ -6834,7 +6855,7 @@
     </p:spTree>
     <p:extLst>
       <p:ext uri="{BB962C8B-B14F-4D97-AF65-F5344CB8AC3E}">
-        <p14:creationId xmlns:p14="http://schemas.microsoft.com/office/powerpoint/2010/main" xmlns="" val="1265907016"/>
+        <p14:creationId xmlns="" xmlns:p14="http://schemas.microsoft.com/office/powerpoint/2010/main" val="1265907016"/>
       </p:ext>
     </p:extLst>
   </p:cSld>
@@ -7158,7 +7179,7 @@
             <a:fld id="{5E0691F5-9D0C-4B99-AAF3-BF4DD8AE5AD6}" type="datetimeFigureOut">
               <a:rPr lang="en-IN" smtClean="0"/>
               <a:pPr/>
-              <a:t>24-02-2016</a:t>
+              <a:t>25-02-2016</a:t>
             </a:fld>
             <a:endParaRPr lang="en-IN"/>
           </a:p>
@@ -7210,7 +7231,7 @@
     </p:spTree>
     <p:extLst>
       <p:ext uri="{BB962C8B-B14F-4D97-AF65-F5344CB8AC3E}">
-        <p14:creationId xmlns:p14="http://schemas.microsoft.com/office/powerpoint/2010/main" xmlns="" val="618977615"/>
+        <p14:creationId xmlns="" xmlns:p14="http://schemas.microsoft.com/office/powerpoint/2010/main" val="618977615"/>
       </p:ext>
     </p:extLst>
   </p:cSld>
@@ -7283,7 +7304,7 @@
             <a:fld id="{5E0691F5-9D0C-4B99-AAF3-BF4DD8AE5AD6}" type="datetimeFigureOut">
               <a:rPr lang="en-IN" smtClean="0"/>
               <a:pPr/>
-              <a:t>24-02-2016</a:t>
+              <a:t>25-02-2016</a:t>
             </a:fld>
             <a:endParaRPr lang="en-IN"/>
           </a:p>
@@ -7335,7 +7356,7 @@
     </p:spTree>
     <p:extLst>
       <p:ext uri="{BB962C8B-B14F-4D97-AF65-F5344CB8AC3E}">
-        <p14:creationId xmlns:p14="http://schemas.microsoft.com/office/powerpoint/2010/main" xmlns="" val="3986691130"/>
+        <p14:creationId xmlns="" xmlns:p14="http://schemas.microsoft.com/office/powerpoint/2010/main" val="3986691130"/>
       </p:ext>
     </p:extLst>
   </p:cSld>
@@ -7380,7 +7401,7 @@
             <a:fld id="{5E0691F5-9D0C-4B99-AAF3-BF4DD8AE5AD6}" type="datetimeFigureOut">
               <a:rPr lang="en-IN" smtClean="0"/>
               <a:pPr/>
-              <a:t>24-02-2016</a:t>
+              <a:t>25-02-2016</a:t>
             </a:fld>
             <a:endParaRPr lang="en-IN"/>
           </a:p>
@@ -7432,7 +7453,7 @@
     </p:spTree>
     <p:extLst>
       <p:ext uri="{BB962C8B-B14F-4D97-AF65-F5344CB8AC3E}">
-        <p14:creationId xmlns:p14="http://schemas.microsoft.com/office/powerpoint/2010/main" xmlns="" val="2293448865"/>
+        <p14:creationId xmlns="" xmlns:p14="http://schemas.microsoft.com/office/powerpoint/2010/main" val="2293448865"/>
       </p:ext>
     </p:extLst>
   </p:cSld>
@@ -7637,7 +7658,7 @@
             <a:fld id="{5E0691F5-9D0C-4B99-AAF3-BF4DD8AE5AD6}" type="datetimeFigureOut">
               <a:rPr lang="en-IN" smtClean="0"/>
               <a:pPr/>
-              <a:t>24-02-2016</a:t>
+              <a:t>25-02-2016</a:t>
             </a:fld>
             <a:endParaRPr lang="en-IN"/>
           </a:p>
@@ -7689,7 +7710,7 @@
     </p:spTree>
     <p:extLst>
       <p:ext uri="{BB962C8B-B14F-4D97-AF65-F5344CB8AC3E}">
-        <p14:creationId xmlns:p14="http://schemas.microsoft.com/office/powerpoint/2010/main" xmlns="" val="4242348760"/>
+        <p14:creationId xmlns="" xmlns:p14="http://schemas.microsoft.com/office/powerpoint/2010/main" val="4242348760"/>
       </p:ext>
     </p:extLst>
   </p:cSld>
@@ -7945,7 +7966,7 @@
             <a:fld id="{5E0691F5-9D0C-4B99-AAF3-BF4DD8AE5AD6}" type="datetimeFigureOut">
               <a:rPr lang="en-IN" smtClean="0"/>
               <a:pPr/>
-              <a:t>24-02-2016</a:t>
+              <a:t>25-02-2016</a:t>
             </a:fld>
             <a:endParaRPr lang="en-IN"/>
           </a:p>
@@ -7954,7 +7975,7 @@
     </p:spTree>
     <p:extLst>
       <p:ext uri="{BB962C8B-B14F-4D97-AF65-F5344CB8AC3E}">
-        <p14:creationId xmlns:p14="http://schemas.microsoft.com/office/powerpoint/2010/main" xmlns="" val="1810002345"/>
+        <p14:creationId xmlns="" xmlns:p14="http://schemas.microsoft.com/office/powerpoint/2010/main" val="1810002345"/>
       </p:ext>
     </p:extLst>
   </p:cSld>
@@ -8648,7 +8669,7 @@
             <a:fld id="{5E0691F5-9D0C-4B99-AAF3-BF4DD8AE5AD6}" type="datetimeFigureOut">
               <a:rPr lang="en-IN" smtClean="0"/>
               <a:pPr/>
-              <a:t>24-02-2016</a:t>
+              <a:t>25-02-2016</a:t>
             </a:fld>
             <a:endParaRPr lang="en-IN"/>
           </a:p>
@@ -8734,7 +8755,7 @@
     </p:spTree>
     <p:extLst>
       <p:ext uri="{BB962C8B-B14F-4D97-AF65-F5344CB8AC3E}">
-        <p14:creationId xmlns:p14="http://schemas.microsoft.com/office/powerpoint/2010/main" xmlns="" val="854385474"/>
+        <p14:creationId xmlns="" xmlns:p14="http://schemas.microsoft.com/office/powerpoint/2010/main" val="854385474"/>
       </p:ext>
     </p:extLst>
   </p:cSld>
@@ -9248,20 +9269,7 @@
                 <a:latin typeface="Calibri" pitchFamily="34" charset="0"/>
                 <a:cs typeface="Times New Roman" panose="02020603050405020304" pitchFamily="18" charset="0"/>
               </a:rPr>
-              <a:t>Group </a:t>
-            </a:r>
-            <a:r>
-              <a:rPr lang="en-IN" sz="2800" dirty="0" smtClean="0">
-                <a:solidFill>
-                  <a:schemeClr val="tx1">
-                    <a:lumMod val="65000"/>
-                    <a:lumOff val="35000"/>
-                  </a:schemeClr>
-                </a:solidFill>
-                <a:latin typeface="Calibri" pitchFamily="34" charset="0"/>
-                <a:cs typeface="Times New Roman" panose="02020603050405020304" pitchFamily="18" charset="0"/>
-              </a:rPr>
-              <a:t>members-</a:t>
+              <a:t>Group members-</a:t>
             </a:r>
           </a:p>
           <a:p>
@@ -9280,8 +9288,14 @@
                 <a:latin typeface="Calibri" pitchFamily="34" charset="0"/>
                 <a:cs typeface="Times New Roman" panose="02020603050405020304" pitchFamily="18" charset="0"/>
               </a:rPr>
-              <a:t>Shubham </a:t>
-            </a:r>
+              <a:t>Shubham Patil</a:t>
+            </a:r>
+          </a:p>
+          <a:p>
+            <a:pPr algn="l">
+              <a:buFont typeface="Arial" pitchFamily="34" charset="0"/>
+              <a:buChar char="•"/>
+            </a:pPr>
             <a:r>
               <a:rPr lang="en-IN" sz="2000" dirty="0" smtClean="0">
                 <a:solidFill>
@@ -9293,7 +9307,7 @@
                 <a:latin typeface="Calibri" pitchFamily="34" charset="0"/>
                 <a:cs typeface="Times New Roman" panose="02020603050405020304" pitchFamily="18" charset="0"/>
               </a:rPr>
-              <a:t>Patil</a:t>
+              <a:t>Akshat Shukla</a:t>
             </a:r>
           </a:p>
           <a:p>
@@ -9312,8 +9326,14 @@
                 <a:latin typeface="Calibri" pitchFamily="34" charset="0"/>
                 <a:cs typeface="Times New Roman" panose="02020603050405020304" pitchFamily="18" charset="0"/>
               </a:rPr>
-              <a:t>Akshat </a:t>
-            </a:r>
+              <a:t>Aishwarya Naidu</a:t>
+            </a:r>
+          </a:p>
+          <a:p>
+            <a:pPr algn="l">
+              <a:buFont typeface="Arial" pitchFamily="34" charset="0"/>
+              <a:buChar char="•"/>
+            </a:pPr>
             <a:r>
               <a:rPr lang="en-IN" sz="2000" dirty="0" smtClean="0">
                 <a:solidFill>
@@ -9325,7 +9345,7 @@
                 <a:latin typeface="Calibri" pitchFamily="34" charset="0"/>
                 <a:cs typeface="Times New Roman" panose="02020603050405020304" pitchFamily="18" charset="0"/>
               </a:rPr>
-              <a:t>Shukla</a:t>
+              <a:t>Raina Kishor</a:t>
             </a:r>
           </a:p>
           <a:p>
@@ -9344,8 +9364,14 @@
                 <a:latin typeface="Calibri" pitchFamily="34" charset="0"/>
                 <a:cs typeface="Times New Roman" panose="02020603050405020304" pitchFamily="18" charset="0"/>
               </a:rPr>
-              <a:t>Aishwarya </a:t>
-            </a:r>
+              <a:t>Jayneeta Sinha</a:t>
+            </a:r>
+          </a:p>
+          <a:p>
+            <a:pPr algn="l">
+              <a:buFont typeface="Arial" pitchFamily="34" charset="0"/>
+              <a:buChar char="•"/>
+            </a:pPr>
             <a:r>
               <a:rPr lang="en-IN" sz="2000" dirty="0" smtClean="0">
                 <a:solidFill>
@@ -9357,103 +9383,7 @@
                 <a:latin typeface="Calibri" pitchFamily="34" charset="0"/>
                 <a:cs typeface="Times New Roman" panose="02020603050405020304" pitchFamily="18" charset="0"/>
               </a:rPr>
-              <a:t>Naidu</a:t>
-            </a:r>
-          </a:p>
-          <a:p>
-            <a:pPr algn="l">
-              <a:buFont typeface="Arial" pitchFamily="34" charset="0"/>
-              <a:buChar char="•"/>
-            </a:pPr>
-            <a:r>
-              <a:rPr lang="en-IN" sz="2000" dirty="0" smtClean="0">
-                <a:solidFill>
-                  <a:schemeClr val="tx1">
-                    <a:lumMod val="65000"/>
-                    <a:lumOff val="35000"/>
-                  </a:schemeClr>
-                </a:solidFill>
-                <a:latin typeface="Calibri" pitchFamily="34" charset="0"/>
-                <a:cs typeface="Times New Roman" panose="02020603050405020304" pitchFamily="18" charset="0"/>
-              </a:rPr>
-              <a:t>Raina </a:t>
-            </a:r>
-            <a:r>
-              <a:rPr lang="en-IN" sz="2000" dirty="0" smtClean="0">
-                <a:solidFill>
-                  <a:schemeClr val="tx1">
-                    <a:lumMod val="65000"/>
-                    <a:lumOff val="35000"/>
-                  </a:schemeClr>
-                </a:solidFill>
-                <a:latin typeface="Calibri" pitchFamily="34" charset="0"/>
-                <a:cs typeface="Times New Roman" panose="02020603050405020304" pitchFamily="18" charset="0"/>
-              </a:rPr>
-              <a:t>Kishor</a:t>
-            </a:r>
-          </a:p>
-          <a:p>
-            <a:pPr algn="l">
-              <a:buFont typeface="Arial" pitchFamily="34" charset="0"/>
-              <a:buChar char="•"/>
-            </a:pPr>
-            <a:r>
-              <a:rPr lang="en-IN" sz="2000" dirty="0" smtClean="0">
-                <a:solidFill>
-                  <a:schemeClr val="tx1">
-                    <a:lumMod val="65000"/>
-                    <a:lumOff val="35000"/>
-                  </a:schemeClr>
-                </a:solidFill>
-                <a:latin typeface="Calibri" pitchFamily="34" charset="0"/>
-                <a:cs typeface="Times New Roman" panose="02020603050405020304" pitchFamily="18" charset="0"/>
-              </a:rPr>
-              <a:t>Jayneeta </a:t>
-            </a:r>
-            <a:r>
-              <a:rPr lang="en-IN" sz="2000" dirty="0" smtClean="0">
-                <a:solidFill>
-                  <a:schemeClr val="tx1">
-                    <a:lumMod val="65000"/>
-                    <a:lumOff val="35000"/>
-                  </a:schemeClr>
-                </a:solidFill>
-                <a:latin typeface="Calibri" pitchFamily="34" charset="0"/>
-                <a:cs typeface="Times New Roman" panose="02020603050405020304" pitchFamily="18" charset="0"/>
-              </a:rPr>
-              <a:t>Sinha</a:t>
-            </a:r>
-          </a:p>
-          <a:p>
-            <a:pPr algn="l">
-              <a:buFont typeface="Arial" pitchFamily="34" charset="0"/>
-              <a:buChar char="•"/>
-            </a:pPr>
-            <a:r>
-              <a:rPr lang="en-IN" sz="2000" dirty="0" smtClean="0">
-                <a:solidFill>
-                  <a:schemeClr val="tx1">
-                    <a:lumMod val="65000"/>
-                    <a:lumOff val="35000"/>
-                  </a:schemeClr>
-                </a:solidFill>
-                <a:latin typeface="Calibri" pitchFamily="34" charset="0"/>
-                <a:cs typeface="Times New Roman" panose="02020603050405020304" pitchFamily="18" charset="0"/>
-              </a:rPr>
-              <a:t>Priyanka </a:t>
-            </a:r>
-            <a:r>
-              <a:rPr lang="en-IN" sz="2000" dirty="0" smtClean="0">
-                <a:solidFill>
-                  <a:schemeClr val="tx1">
-                    <a:lumMod val="65000"/>
-                    <a:lumOff val="35000"/>
-                  </a:schemeClr>
-                </a:solidFill>
-                <a:latin typeface="Calibri" pitchFamily="34" charset="0"/>
-                <a:cs typeface="Times New Roman" panose="02020603050405020304" pitchFamily="18" charset="0"/>
-              </a:rPr>
-              <a:t>Koparkar </a:t>
+              <a:t>Priyanka Koparkar </a:t>
             </a:r>
             <a:endParaRPr lang="en-IN" sz="2000" dirty="0">
               <a:solidFill>
@@ -9471,7 +9401,7 @@
     </p:spTree>
     <p:extLst>
       <p:ext uri="{BB962C8B-B14F-4D97-AF65-F5344CB8AC3E}">
-        <p14:creationId xmlns:p14="http://schemas.microsoft.com/office/powerpoint/2010/main" xmlns="" val="1646587919"/>
+        <p14:creationId xmlns="" xmlns:p14="http://schemas.microsoft.com/office/powerpoint/2010/main" val="1646587919"/>
       </p:ext>
     </p:extLst>
   </p:cSld>
@@ -10572,7 +10502,12 @@
             <p:ph idx="1"/>
           </p:nvPr>
         </p:nvSpPr>
-        <p:spPr/>
+        <p:spPr>
+          <a:xfrm>
+            <a:off x="677334" y="2160589"/>
+            <a:ext cx="8596668" cy="3880773"/>
+          </a:xfrm>
+        </p:spPr>
         <p:txBody>
           <a:bodyPr>
             <a:normAutofit/>
@@ -10583,13 +10518,73 @@
               <a:rPr lang="en-US" sz="2400" dirty="0" smtClean="0">
                 <a:latin typeface="Calibri" pitchFamily="34" charset="0"/>
               </a:rPr>
-              <a:t>Makes use of @Path annotation provided </a:t>
-            </a:r>
-            <a:r>
-              <a:rPr lang="en-US" sz="2400" smtClean="0">
+              <a:t>Makes use of </a:t>
+            </a:r>
+            <a:r>
+              <a:rPr lang="en-US" sz="2400" dirty="0" smtClean="0">
                 <a:latin typeface="Calibri" pitchFamily="34" charset="0"/>
               </a:rPr>
-              <a:t>by Jersey</a:t>
+              <a:t>Path </a:t>
+            </a:r>
+            <a:r>
+              <a:rPr lang="en-US" sz="2400" dirty="0" smtClean="0">
+                <a:latin typeface="Calibri" pitchFamily="34" charset="0"/>
+              </a:rPr>
+              <a:t>annotation provided by </a:t>
+            </a:r>
+            <a:r>
+              <a:rPr lang="en-US" sz="2400" dirty="0" smtClean="0">
+                <a:latin typeface="Calibri" pitchFamily="34" charset="0"/>
+              </a:rPr>
+              <a:t>JAX-RS </a:t>
+            </a:r>
+            <a:r>
+              <a:rPr lang="en-US" sz="2400" dirty="0" err="1" smtClean="0">
+                <a:latin typeface="Calibri" pitchFamily="34" charset="0"/>
+              </a:rPr>
+              <a:t>api</a:t>
+            </a:r>
+            <a:r>
+              <a:rPr lang="en-US" sz="2400" dirty="0" smtClean="0">
+                <a:latin typeface="Calibri" pitchFamily="34" charset="0"/>
+              </a:rPr>
+              <a:t> to export classes as REST Services on the Server</a:t>
+            </a:r>
+          </a:p>
+          <a:p>
+            <a:r>
+              <a:rPr lang="en-US" sz="2400" dirty="0" smtClean="0">
+                <a:latin typeface="Calibri" pitchFamily="34" charset="0"/>
+              </a:rPr>
+              <a:t>Methods marked with Get annotations respond to GET requests to the Path</a:t>
+            </a:r>
+          </a:p>
+          <a:p>
+            <a:r>
+              <a:rPr lang="en-US" sz="2400" dirty="0" smtClean="0">
+                <a:latin typeface="Calibri" pitchFamily="34" charset="0"/>
+              </a:rPr>
+              <a:t>The </a:t>
+            </a:r>
+            <a:r>
+              <a:rPr lang="en-US" sz="2400" dirty="0" err="1" smtClean="0">
+                <a:latin typeface="Calibri" pitchFamily="34" charset="0"/>
+              </a:rPr>
+              <a:t>QueryParam</a:t>
+            </a:r>
+            <a:r>
+              <a:rPr lang="en-US" sz="2400" dirty="0" smtClean="0">
+                <a:latin typeface="Calibri" pitchFamily="34" charset="0"/>
+              </a:rPr>
+              <a:t> annotation is used to get Query parameters from the inbound request and inject them into function arguments</a:t>
+            </a:r>
+          </a:p>
+          <a:p>
+            <a:r>
+              <a:rPr lang="en-US" sz="2400" dirty="0" smtClean="0">
+                <a:latin typeface="Calibri" pitchFamily="34" charset="0"/>
+              </a:rPr>
+              <a:t>Based upon the request, required Handler is invoked.</a:t>
             </a:r>
             <a:endParaRPr lang="en-US" sz="2400" dirty="0" smtClean="0">
               <a:latin typeface="Calibri" pitchFamily="34" charset="0"/>
@@ -10634,16 +10629,18 @@
         </p:nvSpPr>
         <p:spPr/>
         <p:txBody>
-          <a:bodyPr/>
+          <a:bodyPr>
+            <a:normAutofit/>
+          </a:bodyPr>
           <a:lstStyle/>
           <a:p>
             <a:r>
-              <a:rPr lang="en-US" dirty="0" smtClean="0">
+              <a:rPr lang="en-US" sz="4800" b="1" dirty="0" smtClean="0">
                 <a:latin typeface="Calibri" pitchFamily="34" charset="0"/>
               </a:rPr>
               <a:t>Handlers</a:t>
             </a:r>
-            <a:endParaRPr lang="en-IN" dirty="0">
+            <a:endParaRPr lang="en-IN" sz="4800" b="1" dirty="0">
               <a:latin typeface="Calibri" pitchFamily="34" charset="0"/>
             </a:endParaRPr>
           </a:p>
@@ -10661,10 +10658,38 @@
         </p:nvSpPr>
         <p:spPr/>
         <p:txBody>
-          <a:bodyPr/>
+          <a:bodyPr>
+            <a:normAutofit/>
+          </a:bodyPr>
           <a:lstStyle/>
           <a:p>
-            <a:endParaRPr lang="en-IN">
+            <a:r>
+              <a:rPr lang="en-US" sz="2400" dirty="0" smtClean="0">
+                <a:latin typeface="Calibri" pitchFamily="34" charset="0"/>
+              </a:rPr>
+              <a:t>Calls respective DAO classes</a:t>
+            </a:r>
+          </a:p>
+          <a:p>
+            <a:r>
+              <a:rPr lang="en-US" sz="2400" dirty="0" smtClean="0">
+                <a:latin typeface="Calibri" pitchFamily="34" charset="0"/>
+              </a:rPr>
+              <a:t>Converts the returned </a:t>
+            </a:r>
+            <a:r>
+              <a:rPr lang="en-US" sz="2400" dirty="0" err="1" smtClean="0">
+                <a:latin typeface="Calibri" pitchFamily="34" charset="0"/>
+              </a:rPr>
+              <a:t>ArrayList</a:t>
+            </a:r>
+            <a:r>
+              <a:rPr lang="en-US" sz="2400" dirty="0" smtClean="0">
+                <a:latin typeface="Calibri" pitchFamily="34" charset="0"/>
+              </a:rPr>
+              <a:t> and serializes it to a JSON with the help of Google GSON</a:t>
+            </a:r>
+            <a:endParaRPr lang="en-IN" sz="2400" dirty="0">
               <a:latin typeface="Calibri" pitchFamily="34" charset="0"/>
             </a:endParaRPr>
           </a:p>
@@ -10707,16 +10732,18 @@
         </p:nvSpPr>
         <p:spPr/>
         <p:txBody>
-          <a:bodyPr/>
+          <a:bodyPr>
+            <a:normAutofit/>
+          </a:bodyPr>
           <a:lstStyle/>
           <a:p>
             <a:r>
-              <a:rPr lang="en-US" dirty="0" smtClean="0">
+              <a:rPr lang="en-US" sz="4800" b="1" dirty="0" smtClean="0">
                 <a:latin typeface="Calibri" pitchFamily="34" charset="0"/>
               </a:rPr>
               <a:t>DAO – Data Access Objects</a:t>
             </a:r>
-            <a:endParaRPr lang="en-IN" dirty="0">
+            <a:endParaRPr lang="en-IN" sz="4800" b="1" dirty="0">
               <a:latin typeface="Calibri" pitchFamily="34" charset="0"/>
             </a:endParaRPr>
           </a:p>
@@ -10734,10 +10761,55 @@
         </p:nvSpPr>
         <p:spPr/>
         <p:txBody>
-          <a:bodyPr/>
+          <a:bodyPr>
+            <a:normAutofit/>
+          </a:bodyPr>
           <a:lstStyle/>
           <a:p>
-            <a:endParaRPr lang="en-IN">
+            <a:r>
+              <a:rPr lang="en-US" sz="2400" dirty="0" smtClean="0">
+                <a:latin typeface="Calibri" pitchFamily="34" charset="0"/>
+              </a:rPr>
+              <a:t>Handles the DB interaction Logic</a:t>
+            </a:r>
+          </a:p>
+          <a:p>
+            <a:r>
+              <a:rPr lang="en-US" sz="2400" dirty="0" smtClean="0">
+                <a:latin typeface="Calibri" pitchFamily="34" charset="0"/>
+              </a:rPr>
+              <a:t>Consumes the Result Set and puts it into an </a:t>
+            </a:r>
+            <a:r>
+              <a:rPr lang="en-US" sz="2400" dirty="0" err="1" smtClean="0">
+                <a:latin typeface="Calibri" pitchFamily="34" charset="0"/>
+              </a:rPr>
+              <a:t>ArrayList</a:t>
+            </a:r>
+            <a:endParaRPr lang="en-US" sz="2400" dirty="0" smtClean="0">
+              <a:latin typeface="Calibri" pitchFamily="34" charset="0"/>
+            </a:endParaRPr>
+          </a:p>
+          <a:p>
+            <a:r>
+              <a:rPr lang="en-US" sz="2400" dirty="0" smtClean="0">
+                <a:latin typeface="Calibri" pitchFamily="34" charset="0"/>
+              </a:rPr>
+              <a:t>Returns the resulting </a:t>
+            </a:r>
+            <a:r>
+              <a:rPr lang="en-US" sz="2400" dirty="0" err="1" smtClean="0">
+                <a:latin typeface="Calibri" pitchFamily="34" charset="0"/>
+              </a:rPr>
+              <a:t>ArrayList</a:t>
+            </a:r>
+            <a:r>
+              <a:rPr lang="en-US" sz="2400" dirty="0" smtClean="0">
+                <a:latin typeface="Calibri" pitchFamily="34" charset="0"/>
+              </a:rPr>
+              <a:t> to the Handler </a:t>
+            </a:r>
+            <a:endParaRPr lang="en-IN" sz="2400" dirty="0">
               <a:latin typeface="Calibri" pitchFamily="34" charset="0"/>
             </a:endParaRPr>
           </a:p>
@@ -10780,10 +10852,18 @@
         </p:nvSpPr>
         <p:spPr/>
         <p:txBody>
-          <a:bodyPr/>
+          <a:bodyPr>
+            <a:normAutofit/>
+          </a:bodyPr>
           <a:lstStyle/>
           <a:p>
-            <a:endParaRPr lang="en-IN">
+            <a:r>
+              <a:rPr lang="en-US" sz="4800" b="1" dirty="0" smtClean="0">
+                <a:latin typeface="Calibri" pitchFamily="34" charset="0"/>
+              </a:rPr>
+              <a:t>Data Objects</a:t>
+            </a:r>
+            <a:endParaRPr lang="en-IN" sz="4800" b="1" dirty="0">
               <a:latin typeface="Calibri" pitchFamily="34" charset="0"/>
             </a:endParaRPr>
           </a:p>
@@ -10801,10 +10881,18 @@
         </p:nvSpPr>
         <p:spPr/>
         <p:txBody>
-          <a:bodyPr/>
+          <a:bodyPr>
+            <a:normAutofit/>
+          </a:bodyPr>
           <a:lstStyle/>
           <a:p>
-            <a:endParaRPr lang="en-IN">
+            <a:r>
+              <a:rPr lang="en-US" sz="2400" dirty="0" smtClean="0">
+                <a:latin typeface="Calibri" pitchFamily="34" charset="0"/>
+              </a:rPr>
+              <a:t>Resembles the underlying database schema closely</a:t>
+            </a:r>
+            <a:endParaRPr lang="en-IN" sz="2400" dirty="0">
               <a:latin typeface="Calibri" pitchFamily="34" charset="0"/>
             </a:endParaRPr>
           </a:p>
@@ -12343,7 +12431,7 @@
     </p:spTree>
     <p:extLst>
       <p:ext uri="{BB962C8B-B14F-4D97-AF65-F5344CB8AC3E}">
-        <p14:creationId xmlns:p14="http://schemas.microsoft.com/office/powerpoint/2010/main" xmlns="" val="1665069484"/>
+        <p14:creationId xmlns="" xmlns:p14="http://schemas.microsoft.com/office/powerpoint/2010/main" val="1665069484"/>
       </p:ext>
     </p:extLst>
   </p:cSld>
@@ -12861,7 +12949,7 @@
     </p:spTree>
     <p:extLst>
       <p:ext uri="{BB962C8B-B14F-4D97-AF65-F5344CB8AC3E}">
-        <p14:creationId xmlns:p14="http://schemas.microsoft.com/office/powerpoint/2010/main" xmlns="" val="4023520249"/>
+        <p14:creationId xmlns="" xmlns:p14="http://schemas.microsoft.com/office/powerpoint/2010/main" val="4023520249"/>
       </p:ext>
     </p:extLst>
   </p:cSld>
@@ -13565,7 +13653,7 @@
     </p:spTree>
     <p:extLst>
       <p:ext uri="{BB962C8B-B14F-4D97-AF65-F5344CB8AC3E}">
-        <p14:creationId xmlns:p14="http://schemas.microsoft.com/office/powerpoint/2010/main" xmlns="" val="1439879549"/>
+        <p14:creationId xmlns="" xmlns:p14="http://schemas.microsoft.com/office/powerpoint/2010/main" val="1439879549"/>
       </p:ext>
     </p:extLst>
   </p:cSld>
@@ -14087,7 +14175,7 @@
     </p:spTree>
     <p:extLst>
       <p:ext uri="{BB962C8B-B14F-4D97-AF65-F5344CB8AC3E}">
-        <p14:creationId xmlns:p14="http://schemas.microsoft.com/office/powerpoint/2010/main" xmlns="" val="2315167525"/>
+        <p14:creationId xmlns="" xmlns:p14="http://schemas.microsoft.com/office/powerpoint/2010/main" val="2315167525"/>
       </p:ext>
     </p:extLst>
   </p:cSld>
@@ -14435,7 +14523,7 @@
             </a:clrChange>
             <a:extLst>
               <a:ext uri="{28A0092B-C50C-407E-A947-70E740481C1C}">
-                <a14:useLocalDpi xmlns:a14="http://schemas.microsoft.com/office/drawing/2010/main" xmlns="" val="0"/>
+                <a14:useLocalDpi xmlns="" xmlns:a14="http://schemas.microsoft.com/office/drawing/2010/main" val="0"/>
               </a:ext>
             </a:extLst>
           </a:blip>
@@ -14456,7 +14544,7 @@
     </p:spTree>
     <p:extLst>
       <p:ext uri="{BB962C8B-B14F-4D97-AF65-F5344CB8AC3E}">
-        <p14:creationId xmlns:p14="http://schemas.microsoft.com/office/powerpoint/2010/main" xmlns="" val="2554526102"/>
+        <p14:creationId xmlns="" xmlns:p14="http://schemas.microsoft.com/office/powerpoint/2010/main" val="2554526102"/>
       </p:ext>
     </p:extLst>
   </p:cSld>
@@ -14771,7 +14859,7 @@
     </p:spTree>
     <p:extLst>
       <p:ext uri="{BB962C8B-B14F-4D97-AF65-F5344CB8AC3E}">
-        <p14:creationId xmlns:p14="http://schemas.microsoft.com/office/powerpoint/2010/main" xmlns="" val="889664965"/>
+        <p14:creationId xmlns="" xmlns:p14="http://schemas.microsoft.com/office/powerpoint/2010/main" val="889664965"/>
       </p:ext>
     </p:extLst>
   </p:cSld>
@@ -15557,7 +15645,7 @@
     </p:spTree>
     <p:extLst>
       <p:ext uri="{BB962C8B-B14F-4D97-AF65-F5344CB8AC3E}">
-        <p14:creationId xmlns:p14="http://schemas.microsoft.com/office/powerpoint/2010/main" xmlns="" val="2475605198"/>
+        <p14:creationId xmlns="" xmlns:p14="http://schemas.microsoft.com/office/powerpoint/2010/main" val="2475605198"/>
       </p:ext>
     </p:extLst>
   </p:cSld>
@@ -16227,7 +16315,7 @@
   <a:extraClrSchemeLst/>
   <a:extLst>
     <a:ext uri="{05A4C25C-085E-4340-85A3-A5531E510DB2}">
-      <thm15:themeFamily xmlns:thm15="http://schemas.microsoft.com/office/thememl/2012/main" xmlns="" name="Facet" id="{C0C680CD-088A-49FC-A102-D699147F32B2}" vid="{0B5AB586-D108-4FC1-8368-649FE654B894}"/>
+      <thm15:themeFamily xmlns="" xmlns:thm15="http://schemas.microsoft.com/office/thememl/2012/main" name="Facet" id="{C0C680CD-088A-49FC-A102-D699147F32B2}" vid="{0B5AB586-D108-4FC1-8368-649FE654B894}"/>
     </a:ext>
   </a:extLst>
 </a:theme>

</xml_diff>